<commit_message>
updated fcn arch block
</commit_message>
<xml_diff>
--- a/images/presentation/segformer.pptx
+++ b/images/presentation/segformer.pptx
@@ -6,6 +6,7 @@
   </p:sldMasterIdLst>
   <p:sldIdLst>
     <p:sldId id="256" r:id="rId2"/>
+    <p:sldId id="257" r:id="rId3"/>
   </p:sldIdLst>
   <p:sldSz cx="12192000" cy="6858000"/>
   <p:notesSz cx="6858000" cy="9144000"/>
@@ -104,6 +105,11 @@
       </a:defRPr>
     </a:lvl9pPr>
   </p:defaultTextStyle>
+  <p:extLst>
+    <p:ext uri="{EFAFB233-063F-42B5-8137-9DF3F51BA10A}">
+      <p15:sldGuideLst xmlns:p15="http://schemas.microsoft.com/office/powerpoint/2012/main"/>
+    </p:ext>
+  </p:extLst>
 </p:presentation>
 </file>
 
@@ -238,7 +244,7 @@
           <a:p>
             <a:fld id="{9A760A2F-4F2B-4080-A556-B0687F4CB1D8}" type="datetimeFigureOut">
               <a:rPr lang="en-US" smtClean="0"/>
-              <a:t>17-Jul-22</a:t>
+              <a:t>10-Sep-22</a:t>
             </a:fld>
             <a:endParaRPr lang="en-US"/>
           </a:p>
@@ -408,7 +414,7 @@
           <a:p>
             <a:fld id="{9A760A2F-4F2B-4080-A556-B0687F4CB1D8}" type="datetimeFigureOut">
               <a:rPr lang="en-US" smtClean="0"/>
-              <a:t>17-Jul-22</a:t>
+              <a:t>10-Sep-22</a:t>
             </a:fld>
             <a:endParaRPr lang="en-US"/>
           </a:p>
@@ -588,7 +594,7 @@
           <a:p>
             <a:fld id="{9A760A2F-4F2B-4080-A556-B0687F4CB1D8}" type="datetimeFigureOut">
               <a:rPr lang="en-US" smtClean="0"/>
-              <a:t>17-Jul-22</a:t>
+              <a:t>10-Sep-22</a:t>
             </a:fld>
             <a:endParaRPr lang="en-US"/>
           </a:p>
@@ -758,7 +764,7 @@
           <a:p>
             <a:fld id="{9A760A2F-4F2B-4080-A556-B0687F4CB1D8}" type="datetimeFigureOut">
               <a:rPr lang="en-US" smtClean="0"/>
-              <a:t>17-Jul-22</a:t>
+              <a:t>10-Sep-22</a:t>
             </a:fld>
             <a:endParaRPr lang="en-US"/>
           </a:p>
@@ -1004,7 +1010,7 @@
           <a:p>
             <a:fld id="{9A760A2F-4F2B-4080-A556-B0687F4CB1D8}" type="datetimeFigureOut">
               <a:rPr lang="en-US" smtClean="0"/>
-              <a:t>17-Jul-22</a:t>
+              <a:t>10-Sep-22</a:t>
             </a:fld>
             <a:endParaRPr lang="en-US"/>
           </a:p>
@@ -1236,7 +1242,7 @@
           <a:p>
             <a:fld id="{9A760A2F-4F2B-4080-A556-B0687F4CB1D8}" type="datetimeFigureOut">
               <a:rPr lang="en-US" smtClean="0"/>
-              <a:t>17-Jul-22</a:t>
+              <a:t>10-Sep-22</a:t>
             </a:fld>
             <a:endParaRPr lang="en-US"/>
           </a:p>
@@ -1603,7 +1609,7 @@
           <a:p>
             <a:fld id="{9A760A2F-4F2B-4080-A556-B0687F4CB1D8}" type="datetimeFigureOut">
               <a:rPr lang="en-US" smtClean="0"/>
-              <a:t>17-Jul-22</a:t>
+              <a:t>10-Sep-22</a:t>
             </a:fld>
             <a:endParaRPr lang="en-US"/>
           </a:p>
@@ -1721,7 +1727,7 @@
           <a:p>
             <a:fld id="{9A760A2F-4F2B-4080-A556-B0687F4CB1D8}" type="datetimeFigureOut">
               <a:rPr lang="en-US" smtClean="0"/>
-              <a:t>17-Jul-22</a:t>
+              <a:t>10-Sep-22</a:t>
             </a:fld>
             <a:endParaRPr lang="en-US"/>
           </a:p>
@@ -1816,7 +1822,7 @@
           <a:p>
             <a:fld id="{9A760A2F-4F2B-4080-A556-B0687F4CB1D8}" type="datetimeFigureOut">
               <a:rPr lang="en-US" smtClean="0"/>
-              <a:t>17-Jul-22</a:t>
+              <a:t>10-Sep-22</a:t>
             </a:fld>
             <a:endParaRPr lang="en-US"/>
           </a:p>
@@ -2093,7 +2099,7 @@
           <a:p>
             <a:fld id="{9A760A2F-4F2B-4080-A556-B0687F4CB1D8}" type="datetimeFigureOut">
               <a:rPr lang="en-US" smtClean="0"/>
-              <a:t>17-Jul-22</a:t>
+              <a:t>10-Sep-22</a:t>
             </a:fld>
             <a:endParaRPr lang="en-US"/>
           </a:p>
@@ -2346,7 +2352,7 @@
           <a:p>
             <a:fld id="{9A760A2F-4F2B-4080-A556-B0687F4CB1D8}" type="datetimeFigureOut">
               <a:rPr lang="en-US" smtClean="0"/>
-              <a:t>17-Jul-22</a:t>
+              <a:t>10-Sep-22</a:t>
             </a:fld>
             <a:endParaRPr lang="en-US"/>
           </a:p>
@@ -2559,7 +2565,7 @@
           <a:p>
             <a:fld id="{9A760A2F-4F2B-4080-A556-B0687F4CB1D8}" type="datetimeFigureOut">
               <a:rPr lang="en-US" smtClean="0"/>
-              <a:t>17-Jul-22</a:t>
+              <a:t>10-Sep-22</a:t>
             </a:fld>
             <a:endParaRPr lang="en-US"/>
           </a:p>
@@ -3558,6 +3564,1461 @@
 </p:sld>
 </file>
 
+<file path=ppt/slides/slide2.xml><?xml version="1.0" encoding="utf-8"?>
+<p:sld xmlns:a="http://schemas.openxmlformats.org/drawingml/2006/main" xmlns:r="http://schemas.openxmlformats.org/officeDocument/2006/relationships" xmlns:p="http://schemas.openxmlformats.org/presentationml/2006/main">
+  <p:cSld>
+    <p:spTree>
+      <p:nvGrpSpPr>
+        <p:cNvPr id="1" name=""/>
+        <p:cNvGrpSpPr/>
+        <p:nvPr/>
+      </p:nvGrpSpPr>
+      <p:grpSpPr>
+        <a:xfrm>
+          <a:off x="0" y="0"/>
+          <a:ext cx="0" cy="0"/>
+          <a:chOff x="0" y="0"/>
+          <a:chExt cx="0" cy="0"/>
+        </a:xfrm>
+      </p:grpSpPr>
+      <p:pic>
+        <p:nvPicPr>
+          <p:cNvPr id="4" name="Picture 3"/>
+          <p:cNvPicPr>
+            <a:picLocks noChangeAspect="1"/>
+          </p:cNvPicPr>
+          <p:nvPr/>
+        </p:nvPicPr>
+        <p:blipFill rotWithShape="1">
+          <a:blip r:embed="rId2"/>
+          <a:srcRect r="54415"/>
+          <a:stretch/>
+        </p:blipFill>
+        <p:spPr>
+          <a:xfrm>
+            <a:off x="377905" y="953654"/>
+            <a:ext cx="2743200" cy="1542163"/>
+          </a:xfrm>
+          <a:prstGeom prst="rect">
+            <a:avLst/>
+          </a:prstGeom>
+        </p:spPr>
+      </p:pic>
+      <p:pic>
+        <p:nvPicPr>
+          <p:cNvPr id="5" name="Picture 4"/>
+          <p:cNvPicPr>
+            <a:picLocks noChangeAspect="1"/>
+          </p:cNvPicPr>
+          <p:nvPr/>
+        </p:nvPicPr>
+        <p:blipFill rotWithShape="1">
+          <a:blip r:embed="rId2"/>
+          <a:srcRect l="54602"/>
+          <a:stretch/>
+        </p:blipFill>
+        <p:spPr>
+          <a:xfrm>
+            <a:off x="9291319" y="955489"/>
+            <a:ext cx="2743200" cy="1548541"/>
+          </a:xfrm>
+          <a:prstGeom prst="rect">
+            <a:avLst/>
+          </a:prstGeom>
+        </p:spPr>
+      </p:pic>
+      <p:sp>
+        <p:nvSpPr>
+          <p:cNvPr id="6" name="Rounded Rectangle 5"/>
+          <p:cNvSpPr/>
+          <p:nvPr/>
+        </p:nvSpPr>
+        <p:spPr>
+          <a:xfrm>
+            <a:off x="3680085" y="854804"/>
+            <a:ext cx="1214058" cy="1735152"/>
+          </a:xfrm>
+          <a:prstGeom prst="roundRect">
+            <a:avLst>
+              <a:gd name="adj" fmla="val 5091"/>
+            </a:avLst>
+          </a:prstGeom>
+          <a:solidFill>
+            <a:schemeClr val="accent5">
+              <a:lumMod val="20000"/>
+              <a:lumOff val="80000"/>
+            </a:schemeClr>
+          </a:solidFill>
+          <a:ln>
+            <a:solidFill>
+              <a:schemeClr val="tx1"/>
+            </a:solidFill>
+          </a:ln>
+        </p:spPr>
+        <p:style>
+          <a:lnRef idx="2">
+            <a:schemeClr val="accent1">
+              <a:shade val="50000"/>
+            </a:schemeClr>
+          </a:lnRef>
+          <a:fillRef idx="1">
+            <a:schemeClr val="accent1"/>
+          </a:fillRef>
+          <a:effectRef idx="0">
+            <a:schemeClr val="accent1"/>
+          </a:effectRef>
+          <a:fontRef idx="minor">
+            <a:schemeClr val="lt1"/>
+          </a:fontRef>
+        </p:style>
+        <p:txBody>
+          <a:bodyPr rot="0" spcFirstLastPara="0" vertOverflow="overflow" horzOverflow="overflow" vert="horz" wrap="square" lIns="51435" tIns="25718" rIns="51435" bIns="25718" numCol="1" spcCol="0" rtlCol="0" fromWordArt="0" anchor="ctr" anchorCtr="0" forceAA="0" compatLnSpc="1">
+            <a:prstTxWarp prst="textNoShape">
+              <a:avLst/>
+            </a:prstTxWarp>
+            <a:noAutofit/>
+          </a:bodyPr>
+          <a:lstStyle/>
+          <a:p>
+            <a:pPr algn="ctr"/>
+            <a:r>
+              <a:rPr lang="en-US" sz="1000" dirty="0" smtClean="0">
+                <a:solidFill>
+                  <a:srgbClr val="0070C0"/>
+                </a:solidFill>
+                <a:latin typeface="Tahoma" panose="020B0604030504040204" pitchFamily="34" charset="0"/>
+                <a:ea typeface="Tahoma" panose="020B0604030504040204" pitchFamily="34" charset="0"/>
+                <a:cs typeface="Tahoma" panose="020B0604030504040204" pitchFamily="34" charset="0"/>
+              </a:rPr>
+              <a:t>Resnet</a:t>
+            </a:r>
+            <a:r>
+              <a:rPr lang="en-US" sz="1000" dirty="0" smtClean="0">
+                <a:solidFill>
+                  <a:srgbClr val="0070C0"/>
+                </a:solidFill>
+                <a:latin typeface="Tahoma" panose="020B0604030504040204" pitchFamily="34" charset="0"/>
+                <a:ea typeface="Tahoma" panose="020B0604030504040204" pitchFamily="34" charset="0"/>
+                <a:cs typeface="Tahoma" panose="020B0604030504040204" pitchFamily="34" charset="0"/>
+              </a:rPr>
+              <a:t>50 backbone</a:t>
+            </a:r>
+            <a:endParaRPr lang="en-US" sz="1000" dirty="0">
+              <a:solidFill>
+                <a:srgbClr val="0070C0"/>
+              </a:solidFill>
+              <a:latin typeface="Tahoma" panose="020B0604030504040204" pitchFamily="34" charset="0"/>
+              <a:ea typeface="Tahoma" panose="020B0604030504040204" pitchFamily="34" charset="0"/>
+              <a:cs typeface="Tahoma" panose="020B0604030504040204" pitchFamily="34" charset="0"/>
+            </a:endParaRPr>
+          </a:p>
+        </p:txBody>
+      </p:sp>
+      <p:sp>
+        <p:nvSpPr>
+          <p:cNvPr id="33" name="TextBox 32"/>
+          <p:cNvSpPr txBox="1"/>
+          <p:nvPr/>
+        </p:nvSpPr>
+        <p:spPr>
+          <a:xfrm rot="16200000">
+            <a:off x="4767257" y="1147495"/>
+            <a:ext cx="851692" cy="215444"/>
+          </a:xfrm>
+          <a:prstGeom prst="rect">
+            <a:avLst/>
+          </a:prstGeom>
+          <a:noFill/>
+        </p:spPr>
+        <p:txBody>
+          <a:bodyPr wrap="square" rtlCol="0">
+            <a:spAutoFit/>
+          </a:bodyPr>
+          <a:lstStyle/>
+          <a:p>
+            <a:pPr algn="ctr"/>
+            <a:r>
+              <a:rPr lang="en-US" sz="800" dirty="0" smtClean="0">
+                <a:latin typeface="Tahoma" panose="020B0604030504040204" pitchFamily="34" charset="0"/>
+                <a:ea typeface="Tahoma" panose="020B0604030504040204" pitchFamily="34" charset="0"/>
+                <a:cs typeface="Tahoma" panose="020B0604030504040204" pitchFamily="34" charset="0"/>
+              </a:rPr>
+              <a:t>(</a:t>
+            </a:r>
+            <a:r>
+              <a:rPr lang="en-US" sz="800" dirty="0" smtClean="0">
+                <a:latin typeface="Tahoma" panose="020B0604030504040204" pitchFamily="34" charset="0"/>
+                <a:ea typeface="Tahoma" panose="020B0604030504040204" pitchFamily="34" charset="0"/>
+                <a:cs typeface="Tahoma" panose="020B0604030504040204" pitchFamily="34" charset="0"/>
+              </a:rPr>
+              <a:t>2048, 12, 20</a:t>
+            </a:r>
+            <a:r>
+              <a:rPr lang="en-US" sz="800" dirty="0" smtClean="0">
+                <a:latin typeface="Tahoma" panose="020B0604030504040204" pitchFamily="34" charset="0"/>
+                <a:ea typeface="Tahoma" panose="020B0604030504040204" pitchFamily="34" charset="0"/>
+                <a:cs typeface="Tahoma" panose="020B0604030504040204" pitchFamily="34" charset="0"/>
+              </a:rPr>
+              <a:t>)</a:t>
+            </a:r>
+            <a:endParaRPr lang="en-US" sz="800" dirty="0">
+              <a:latin typeface="Tahoma" panose="020B0604030504040204" pitchFamily="34" charset="0"/>
+              <a:ea typeface="Tahoma" panose="020B0604030504040204" pitchFamily="34" charset="0"/>
+              <a:cs typeface="Tahoma" panose="020B0604030504040204" pitchFamily="34" charset="0"/>
+            </a:endParaRPr>
+          </a:p>
+        </p:txBody>
+      </p:sp>
+      <p:sp>
+        <p:nvSpPr>
+          <p:cNvPr id="8" name="TextBox 7"/>
+          <p:cNvSpPr txBox="1"/>
+          <p:nvPr/>
+        </p:nvSpPr>
+        <p:spPr>
+          <a:xfrm rot="16200000">
+            <a:off x="8365773" y="1147494"/>
+            <a:ext cx="1123951" cy="215444"/>
+          </a:xfrm>
+          <a:prstGeom prst="rect">
+            <a:avLst/>
+          </a:prstGeom>
+          <a:noFill/>
+        </p:spPr>
+        <p:txBody>
+          <a:bodyPr wrap="square" rtlCol="0">
+            <a:spAutoFit/>
+          </a:bodyPr>
+          <a:lstStyle/>
+          <a:p>
+            <a:pPr algn="ctr"/>
+            <a:r>
+              <a:rPr lang="en-US" sz="800" dirty="0" smtClean="0">
+                <a:latin typeface="Tahoma" panose="020B0604030504040204" pitchFamily="34" charset="0"/>
+                <a:ea typeface="Tahoma" panose="020B0604030504040204" pitchFamily="34" charset="0"/>
+                <a:cs typeface="Tahoma" panose="020B0604030504040204" pitchFamily="34" charset="0"/>
+              </a:rPr>
+              <a:t>(3, 360, 640)</a:t>
+            </a:r>
+            <a:endParaRPr lang="en-US" sz="800" dirty="0">
+              <a:latin typeface="Tahoma" panose="020B0604030504040204" pitchFamily="34" charset="0"/>
+              <a:ea typeface="Tahoma" panose="020B0604030504040204" pitchFamily="34" charset="0"/>
+              <a:cs typeface="Tahoma" panose="020B0604030504040204" pitchFamily="34" charset="0"/>
+            </a:endParaRPr>
+          </a:p>
+        </p:txBody>
+      </p:sp>
+      <p:grpSp>
+        <p:nvGrpSpPr>
+          <p:cNvPr id="62" name="Group 61"/>
+          <p:cNvGrpSpPr/>
+          <p:nvPr/>
+        </p:nvGrpSpPr>
+        <p:grpSpPr>
+          <a:xfrm>
+            <a:off x="5492883" y="447348"/>
+            <a:ext cx="3071294" cy="2209358"/>
+            <a:chOff x="5434885" y="442322"/>
+            <a:chExt cx="3071294" cy="2209358"/>
+          </a:xfrm>
+        </p:grpSpPr>
+        <p:sp>
+          <p:nvSpPr>
+            <p:cNvPr id="32" name="TextBox 31"/>
+            <p:cNvSpPr txBox="1"/>
+            <p:nvPr/>
+          </p:nvSpPr>
+          <p:spPr>
+            <a:xfrm>
+              <a:off x="5742137" y="442322"/>
+              <a:ext cx="1762148" cy="276999"/>
+            </a:xfrm>
+            <a:prstGeom prst="rect">
+              <a:avLst/>
+            </a:prstGeom>
+            <a:noFill/>
+          </p:spPr>
+          <p:txBody>
+            <a:bodyPr wrap="square" rtlCol="0">
+              <a:spAutoFit/>
+            </a:bodyPr>
+            <a:lstStyle/>
+            <a:p>
+              <a:pPr algn="ctr"/>
+              <a:r>
+                <a:rPr lang="en-US" sz="1200" b="1" dirty="0" smtClean="0">
+                  <a:solidFill>
+                    <a:schemeClr val="accent2"/>
+                  </a:solidFill>
+                  <a:latin typeface="Tahoma" panose="020B0604030504040204" pitchFamily="34" charset="0"/>
+                  <a:ea typeface="Tahoma" panose="020B0604030504040204" pitchFamily="34" charset="0"/>
+                  <a:cs typeface="Tahoma" panose="020B0604030504040204" pitchFamily="34" charset="0"/>
+                </a:rPr>
+                <a:t>Classifier head</a:t>
+              </a:r>
+              <a:endParaRPr lang="en-US" sz="1200" b="1" dirty="0">
+                <a:solidFill>
+                  <a:schemeClr val="accent2"/>
+                </a:solidFill>
+                <a:latin typeface="Tahoma" panose="020B0604030504040204" pitchFamily="34" charset="0"/>
+                <a:ea typeface="Tahoma" panose="020B0604030504040204" pitchFamily="34" charset="0"/>
+                <a:cs typeface="Tahoma" panose="020B0604030504040204" pitchFamily="34" charset="0"/>
+              </a:endParaRPr>
+            </a:p>
+          </p:txBody>
+        </p:sp>
+        <p:grpSp>
+          <p:nvGrpSpPr>
+            <p:cNvPr id="58" name="Group 57"/>
+            <p:cNvGrpSpPr/>
+            <p:nvPr/>
+          </p:nvGrpSpPr>
+          <p:grpSpPr>
+            <a:xfrm>
+              <a:off x="5434885" y="675914"/>
+              <a:ext cx="3071294" cy="1975766"/>
+              <a:chOff x="5434885" y="675914"/>
+              <a:chExt cx="3071294" cy="1975766"/>
+            </a:xfrm>
+          </p:grpSpPr>
+          <p:grpSp>
+            <p:nvGrpSpPr>
+              <p:cNvPr id="45" name="Group 44"/>
+              <p:cNvGrpSpPr/>
+              <p:nvPr/>
+            </p:nvGrpSpPr>
+            <p:grpSpPr>
+              <a:xfrm>
+                <a:off x="5434885" y="723537"/>
+                <a:ext cx="3071294" cy="1928143"/>
+                <a:chOff x="5406310" y="723537"/>
+                <a:chExt cx="3071294" cy="1928143"/>
+              </a:xfrm>
+            </p:grpSpPr>
+            <p:grpSp>
+              <p:nvGrpSpPr>
+                <p:cNvPr id="38" name="Group 37"/>
+                <p:cNvGrpSpPr/>
+                <p:nvPr/>
+              </p:nvGrpSpPr>
+              <p:grpSpPr>
+                <a:xfrm>
+                  <a:off x="5406310" y="723537"/>
+                  <a:ext cx="2718300" cy="1928143"/>
+                  <a:chOff x="5411529" y="1574854"/>
+                  <a:chExt cx="3073122" cy="2178069"/>
+                </a:xfrm>
+              </p:grpSpPr>
+              <p:cxnSp>
+                <p:nvCxnSpPr>
+                  <p:cNvPr id="14" name="Straight Arrow Connector 13"/>
+                  <p:cNvCxnSpPr>
+                    <a:stCxn id="28" idx="2"/>
+                    <a:endCxn id="18" idx="0"/>
+                  </p:cNvCxnSpPr>
+                  <p:nvPr/>
+                </p:nvCxnSpPr>
+                <p:spPr>
+                  <a:xfrm>
+                    <a:off x="7287164" y="2713092"/>
+                    <a:ext cx="230787" cy="0"/>
+                  </a:xfrm>
+                  <a:prstGeom prst="straightConnector1">
+                    <a:avLst/>
+                  </a:prstGeom>
+                  <a:ln>
+                    <a:solidFill>
+                      <a:schemeClr val="tx1"/>
+                    </a:solidFill>
+                    <a:tailEnd type="triangle"/>
+                  </a:ln>
+                </p:spPr>
+                <p:style>
+                  <a:lnRef idx="1">
+                    <a:schemeClr val="accent1"/>
+                  </a:lnRef>
+                  <a:fillRef idx="0">
+                    <a:schemeClr val="accent1"/>
+                  </a:fillRef>
+                  <a:effectRef idx="0">
+                    <a:schemeClr val="accent1"/>
+                  </a:effectRef>
+                  <a:fontRef idx="minor">
+                    <a:schemeClr val="tx1"/>
+                  </a:fontRef>
+                </p:style>
+              </p:cxnSp>
+              <p:grpSp>
+                <p:nvGrpSpPr>
+                  <p:cNvPr id="37" name="Group 36"/>
+                  <p:cNvGrpSpPr/>
+                  <p:nvPr/>
+                </p:nvGrpSpPr>
+                <p:grpSpPr>
+                  <a:xfrm rot="16200000">
+                    <a:off x="5859055" y="1127328"/>
+                    <a:ext cx="2178069" cy="3073122"/>
+                    <a:chOff x="5841216" y="1112884"/>
+                    <a:chExt cx="2178069" cy="3073122"/>
+                  </a:xfrm>
+                </p:grpSpPr>
+                <p:sp>
+                  <p:nvSpPr>
+                    <p:cNvPr id="11" name="TextBox 10"/>
+                    <p:cNvSpPr txBox="1"/>
+                    <p:nvPr/>
+                  </p:nvSpPr>
+                  <p:spPr>
+                    <a:xfrm>
+                      <a:off x="6876284" y="2980803"/>
+                      <a:ext cx="1123951" cy="246221"/>
+                    </a:xfrm>
+                    <a:prstGeom prst="rect">
+                      <a:avLst/>
+                    </a:prstGeom>
+                    <a:noFill/>
+                  </p:spPr>
+                  <p:txBody>
+                    <a:bodyPr wrap="square" rtlCol="0">
+                      <a:spAutoFit/>
+                    </a:bodyPr>
+                    <a:lstStyle/>
+                    <a:p>
+                      <a:pPr algn="ctr"/>
+                      <a:r>
+                        <a:rPr lang="en-US" sz="800" dirty="0">
+                          <a:latin typeface="Tahoma" panose="020B0604030504040204" pitchFamily="34" charset="0"/>
+                          <a:ea typeface="Tahoma" panose="020B0604030504040204" pitchFamily="34" charset="0"/>
+                          <a:cs typeface="Tahoma" panose="020B0604030504040204" pitchFamily="34" charset="0"/>
+                        </a:rPr>
+                        <a:t>(512, 12, 20)</a:t>
+                      </a:r>
+                      <a:endParaRPr lang="en-US" sz="800" dirty="0">
+                        <a:latin typeface="Tahoma" panose="020B0604030504040204" pitchFamily="34" charset="0"/>
+                        <a:ea typeface="Tahoma" panose="020B0604030504040204" pitchFamily="34" charset="0"/>
+                        <a:cs typeface="Tahoma" panose="020B0604030504040204" pitchFamily="34" charset="0"/>
+                      </a:endParaRPr>
+                    </a:p>
+                  </p:txBody>
+                </p:sp>
+                <p:grpSp>
+                  <p:nvGrpSpPr>
+                    <p:cNvPr id="36" name="Group 35"/>
+                    <p:cNvGrpSpPr/>
+                    <p:nvPr/>
+                  </p:nvGrpSpPr>
+                  <p:grpSpPr>
+                    <a:xfrm>
+                      <a:off x="5841216" y="1112884"/>
+                      <a:ext cx="2178069" cy="3073122"/>
+                      <a:chOff x="7597246" y="2656338"/>
+                      <a:chExt cx="2178069" cy="3073122"/>
+                    </a:xfrm>
+                  </p:grpSpPr>
+                  <p:grpSp>
+                    <p:nvGrpSpPr>
+                      <p:cNvPr id="34" name="Group 33"/>
+                      <p:cNvGrpSpPr/>
+                      <p:nvPr/>
+                    </p:nvGrpSpPr>
+                    <p:grpSpPr>
+                      <a:xfrm>
+                        <a:off x="7749533" y="2802254"/>
+                        <a:ext cx="2025782" cy="2927206"/>
+                        <a:chOff x="7749533" y="2802254"/>
+                        <a:chExt cx="2025782" cy="2927206"/>
+                      </a:xfrm>
+                    </p:grpSpPr>
+                    <p:grpSp>
+                      <p:nvGrpSpPr>
+                        <p:cNvPr id="12" name="Group 11"/>
+                        <p:cNvGrpSpPr/>
+                        <p:nvPr/>
+                      </p:nvGrpSpPr>
+                      <p:grpSpPr>
+                        <a:xfrm>
+                          <a:off x="7749533" y="2802254"/>
+                          <a:ext cx="2025782" cy="1729721"/>
+                          <a:chOff x="1793931" y="3812633"/>
+                          <a:chExt cx="2025782" cy="1729721"/>
+                        </a:xfrm>
+                      </p:grpSpPr>
+                      <p:grpSp>
+                        <p:nvGrpSpPr>
+                          <p:cNvPr id="23" name="Group 22"/>
+                          <p:cNvGrpSpPr/>
+                          <p:nvPr/>
+                        </p:nvGrpSpPr>
+                        <p:grpSpPr>
+                          <a:xfrm>
+                            <a:off x="1793931" y="3812633"/>
+                            <a:ext cx="1775086" cy="1729721"/>
+                            <a:chOff x="1793931" y="3812633"/>
+                            <a:chExt cx="1775086" cy="1729721"/>
+                          </a:xfrm>
+                        </p:grpSpPr>
+                        <p:sp>
+                          <p:nvSpPr>
+                            <p:cNvPr id="26" name="Rounded Rectangle 25"/>
+                            <p:cNvSpPr/>
+                            <p:nvPr/>
+                          </p:nvSpPr>
+                          <p:spPr>
+                            <a:xfrm>
+                              <a:off x="1793931" y="3812633"/>
+                              <a:ext cx="1775086" cy="399071"/>
+                            </a:xfrm>
+                            <a:prstGeom prst="roundRect">
+                              <a:avLst/>
+                            </a:prstGeom>
+                            <a:solidFill>
+                              <a:schemeClr val="accent2">
+                                <a:lumMod val="20000"/>
+                                <a:lumOff val="80000"/>
+                              </a:schemeClr>
+                            </a:solidFill>
+                            <a:ln>
+                              <a:solidFill>
+                                <a:schemeClr val="bg1">
+                                  <a:lumMod val="75000"/>
+                                </a:schemeClr>
+                              </a:solidFill>
+                            </a:ln>
+                          </p:spPr>
+                          <p:style>
+                            <a:lnRef idx="2">
+                              <a:schemeClr val="accent1">
+                                <a:shade val="50000"/>
+                              </a:schemeClr>
+                            </a:lnRef>
+                            <a:fillRef idx="1">
+                              <a:schemeClr val="accent1"/>
+                            </a:fillRef>
+                            <a:effectRef idx="0">
+                              <a:schemeClr val="accent1"/>
+                            </a:effectRef>
+                            <a:fontRef idx="minor">
+                              <a:schemeClr val="lt1"/>
+                            </a:fontRef>
+                          </p:style>
+                          <p:txBody>
+                            <a:bodyPr rot="0" spcFirstLastPara="0" vertOverflow="overflow" horzOverflow="overflow" vert="horz" wrap="square" lIns="51435" tIns="25718" rIns="51435" bIns="25718" numCol="1" spcCol="0" rtlCol="0" fromWordArt="0" anchor="ctr" anchorCtr="0" forceAA="0" compatLnSpc="1">
+                              <a:prstTxWarp prst="textNoShape">
+                                <a:avLst/>
+                              </a:prstTxWarp>
+                              <a:noAutofit/>
+                            </a:bodyPr>
+                            <a:lstStyle/>
+                            <a:p>
+                              <a:pPr algn="ctr"/>
+                              <a:r>
+                                <a:rPr lang="en-US" sz="800" dirty="0" smtClean="0">
+                                  <a:solidFill>
+                                    <a:srgbClr val="0070C0"/>
+                                  </a:solidFill>
+                                  <a:latin typeface="Tahoma" panose="020B0604030504040204" pitchFamily="34" charset="0"/>
+                                  <a:ea typeface="Tahoma" panose="020B0604030504040204" pitchFamily="34" charset="0"/>
+                                  <a:cs typeface="Tahoma" panose="020B0604030504040204" pitchFamily="34" charset="0"/>
+                                </a:rPr>
+                                <a:t>Conv2d (2048, 512, </a:t>
+                              </a:r>
+                              <a:r>
+                                <a:rPr lang="en-US" sz="800" dirty="0" smtClean="0">
+                                  <a:solidFill>
+                                    <a:srgbClr val="0070C0"/>
+                                  </a:solidFill>
+                                  <a:latin typeface="Tahoma" panose="020B0604030504040204" pitchFamily="34" charset="0"/>
+                                  <a:ea typeface="Tahoma" panose="020B0604030504040204" pitchFamily="34" charset="0"/>
+                                  <a:cs typeface="Tahoma" panose="020B0604030504040204" pitchFamily="34" charset="0"/>
+                                </a:rPr>
+                                <a:t>3)</a:t>
+                              </a:r>
+                              <a:endParaRPr lang="en-US" sz="800" dirty="0">
+                                <a:solidFill>
+                                  <a:srgbClr val="0070C0"/>
+                                </a:solidFill>
+                                <a:latin typeface="Tahoma" panose="020B0604030504040204" pitchFamily="34" charset="0"/>
+                                <a:ea typeface="Tahoma" panose="020B0604030504040204" pitchFamily="34" charset="0"/>
+                                <a:cs typeface="Tahoma" panose="020B0604030504040204" pitchFamily="34" charset="0"/>
+                              </a:endParaRPr>
+                            </a:p>
+                          </p:txBody>
+                        </p:sp>
+                        <p:sp>
+                          <p:nvSpPr>
+                            <p:cNvPr id="27" name="Rounded Rectangle 26"/>
+                            <p:cNvSpPr/>
+                            <p:nvPr/>
+                          </p:nvSpPr>
+                          <p:spPr>
+                            <a:xfrm>
+                              <a:off x="1793931" y="4477958"/>
+                              <a:ext cx="1775086" cy="399071"/>
+                            </a:xfrm>
+                            <a:prstGeom prst="roundRect">
+                              <a:avLst/>
+                            </a:prstGeom>
+                            <a:solidFill>
+                              <a:schemeClr val="accent2">
+                                <a:lumMod val="20000"/>
+                                <a:lumOff val="80000"/>
+                              </a:schemeClr>
+                            </a:solidFill>
+                            <a:ln>
+                              <a:solidFill>
+                                <a:schemeClr val="bg1">
+                                  <a:lumMod val="75000"/>
+                                </a:schemeClr>
+                              </a:solidFill>
+                            </a:ln>
+                          </p:spPr>
+                          <p:style>
+                            <a:lnRef idx="2">
+                              <a:schemeClr val="accent1">
+                                <a:shade val="50000"/>
+                              </a:schemeClr>
+                            </a:lnRef>
+                            <a:fillRef idx="1">
+                              <a:schemeClr val="accent1"/>
+                            </a:fillRef>
+                            <a:effectRef idx="0">
+                              <a:schemeClr val="accent1"/>
+                            </a:effectRef>
+                            <a:fontRef idx="minor">
+                              <a:schemeClr val="lt1"/>
+                            </a:fontRef>
+                          </p:style>
+                          <p:txBody>
+                            <a:bodyPr rot="0" spcFirstLastPara="0" vertOverflow="overflow" horzOverflow="overflow" vert="horz" wrap="square" lIns="51435" tIns="25718" rIns="51435" bIns="25718" numCol="1" spcCol="0" rtlCol="0" fromWordArt="0" anchor="ctr" anchorCtr="0" forceAA="0" compatLnSpc="1">
+                              <a:prstTxWarp prst="textNoShape">
+                                <a:avLst/>
+                              </a:prstTxWarp>
+                              <a:noAutofit/>
+                            </a:bodyPr>
+                            <a:lstStyle/>
+                            <a:p>
+                              <a:pPr algn="ctr"/>
+                              <a:r>
+                                <a:rPr lang="en-US" sz="800" dirty="0" smtClean="0">
+                                  <a:solidFill>
+                                    <a:srgbClr val="0070C0"/>
+                                  </a:solidFill>
+                                  <a:latin typeface="Tahoma" panose="020B0604030504040204" pitchFamily="34" charset="0"/>
+                                  <a:ea typeface="Tahoma" panose="020B0604030504040204" pitchFamily="34" charset="0"/>
+                                  <a:cs typeface="Tahoma" panose="020B0604030504040204" pitchFamily="34" charset="0"/>
+                                </a:rPr>
+                                <a:t>BatchNorm2d (512)</a:t>
+                              </a:r>
+                              <a:endParaRPr lang="en-US" sz="800" dirty="0">
+                                <a:solidFill>
+                                  <a:srgbClr val="0070C0"/>
+                                </a:solidFill>
+                                <a:latin typeface="Tahoma" panose="020B0604030504040204" pitchFamily="34" charset="0"/>
+                                <a:ea typeface="Tahoma" panose="020B0604030504040204" pitchFamily="34" charset="0"/>
+                                <a:cs typeface="Tahoma" panose="020B0604030504040204" pitchFamily="34" charset="0"/>
+                              </a:endParaRPr>
+                            </a:p>
+                          </p:txBody>
+                        </p:sp>
+                        <p:sp>
+                          <p:nvSpPr>
+                            <p:cNvPr id="28" name="Rounded Rectangle 27"/>
+                            <p:cNvSpPr/>
+                            <p:nvPr/>
+                          </p:nvSpPr>
+                          <p:spPr>
+                            <a:xfrm>
+                              <a:off x="1793931" y="5143283"/>
+                              <a:ext cx="1775086" cy="399071"/>
+                            </a:xfrm>
+                            <a:prstGeom prst="roundRect">
+                              <a:avLst/>
+                            </a:prstGeom>
+                            <a:solidFill>
+                              <a:schemeClr val="accent2">
+                                <a:lumMod val="20000"/>
+                                <a:lumOff val="80000"/>
+                              </a:schemeClr>
+                            </a:solidFill>
+                            <a:ln>
+                              <a:solidFill>
+                                <a:schemeClr val="bg1">
+                                  <a:lumMod val="75000"/>
+                                </a:schemeClr>
+                              </a:solidFill>
+                            </a:ln>
+                          </p:spPr>
+                          <p:style>
+                            <a:lnRef idx="2">
+                              <a:schemeClr val="accent1">
+                                <a:shade val="50000"/>
+                              </a:schemeClr>
+                            </a:lnRef>
+                            <a:fillRef idx="1">
+                              <a:schemeClr val="accent1"/>
+                            </a:fillRef>
+                            <a:effectRef idx="0">
+                              <a:schemeClr val="accent1"/>
+                            </a:effectRef>
+                            <a:fontRef idx="minor">
+                              <a:schemeClr val="lt1"/>
+                            </a:fontRef>
+                          </p:style>
+                          <p:txBody>
+                            <a:bodyPr rot="0" spcFirstLastPara="0" vertOverflow="overflow" horzOverflow="overflow" vert="horz" wrap="square" lIns="51435" tIns="25718" rIns="51435" bIns="25718" numCol="1" spcCol="0" rtlCol="0" fromWordArt="0" anchor="ctr" anchorCtr="0" forceAA="0" compatLnSpc="1">
+                              <a:prstTxWarp prst="textNoShape">
+                                <a:avLst/>
+                              </a:prstTxWarp>
+                              <a:noAutofit/>
+                            </a:bodyPr>
+                            <a:lstStyle/>
+                            <a:p>
+                              <a:pPr algn="ctr"/>
+                              <a:r>
+                                <a:rPr lang="en-US" sz="800" dirty="0" smtClean="0">
+                                  <a:solidFill>
+                                    <a:srgbClr val="0070C0"/>
+                                  </a:solidFill>
+                                  <a:latin typeface="Tahoma" panose="020B0604030504040204" pitchFamily="34" charset="0"/>
+                                  <a:ea typeface="Tahoma" panose="020B0604030504040204" pitchFamily="34" charset="0"/>
+                                  <a:cs typeface="Tahoma" panose="020B0604030504040204" pitchFamily="34" charset="0"/>
+                                </a:rPr>
+                                <a:t>ReLU Activation</a:t>
+                              </a:r>
+                              <a:endParaRPr lang="en-US" sz="800" dirty="0">
+                                <a:solidFill>
+                                  <a:srgbClr val="0070C0"/>
+                                </a:solidFill>
+                                <a:latin typeface="Tahoma" panose="020B0604030504040204" pitchFamily="34" charset="0"/>
+                                <a:ea typeface="Tahoma" panose="020B0604030504040204" pitchFamily="34" charset="0"/>
+                                <a:cs typeface="Tahoma" panose="020B0604030504040204" pitchFamily="34" charset="0"/>
+                              </a:endParaRPr>
+                            </a:p>
+                          </p:txBody>
+                        </p:sp>
+                        <p:cxnSp>
+                          <p:nvCxnSpPr>
+                            <p:cNvPr id="29" name="Straight Arrow Connector 28"/>
+                            <p:cNvCxnSpPr>
+                              <a:stCxn id="26" idx="2"/>
+                              <a:endCxn id="27" idx="0"/>
+                            </p:cNvCxnSpPr>
+                            <p:nvPr/>
+                          </p:nvCxnSpPr>
+                          <p:spPr>
+                            <a:xfrm>
+                              <a:off x="2681474" y="4211704"/>
+                              <a:ext cx="0" cy="266254"/>
+                            </a:xfrm>
+                            <a:prstGeom prst="straightConnector1">
+                              <a:avLst/>
+                            </a:prstGeom>
+                            <a:ln>
+                              <a:solidFill>
+                                <a:schemeClr val="tx1"/>
+                              </a:solidFill>
+                              <a:tailEnd type="triangle"/>
+                            </a:ln>
+                          </p:spPr>
+                          <p:style>
+                            <a:lnRef idx="1">
+                              <a:schemeClr val="accent1"/>
+                            </a:lnRef>
+                            <a:fillRef idx="0">
+                              <a:schemeClr val="accent1"/>
+                            </a:fillRef>
+                            <a:effectRef idx="0">
+                              <a:schemeClr val="accent1"/>
+                            </a:effectRef>
+                            <a:fontRef idx="minor">
+                              <a:schemeClr val="tx1"/>
+                            </a:fontRef>
+                          </p:style>
+                        </p:cxnSp>
+                        <p:cxnSp>
+                          <p:nvCxnSpPr>
+                            <p:cNvPr id="30" name="Straight Arrow Connector 29"/>
+                            <p:cNvCxnSpPr>
+                              <a:stCxn id="27" idx="2"/>
+                              <a:endCxn id="28" idx="0"/>
+                            </p:cNvCxnSpPr>
+                            <p:nvPr/>
+                          </p:nvCxnSpPr>
+                          <p:spPr>
+                            <a:xfrm>
+                              <a:off x="2681474" y="4877029"/>
+                              <a:ext cx="0" cy="266254"/>
+                            </a:xfrm>
+                            <a:prstGeom prst="straightConnector1">
+                              <a:avLst/>
+                            </a:prstGeom>
+                            <a:ln>
+                              <a:solidFill>
+                                <a:schemeClr val="tx1"/>
+                              </a:solidFill>
+                              <a:tailEnd type="triangle"/>
+                            </a:ln>
+                          </p:spPr>
+                          <p:style>
+                            <a:lnRef idx="1">
+                              <a:schemeClr val="accent1"/>
+                            </a:lnRef>
+                            <a:fillRef idx="0">
+                              <a:schemeClr val="accent1"/>
+                            </a:fillRef>
+                            <a:effectRef idx="0">
+                              <a:schemeClr val="accent1"/>
+                            </a:effectRef>
+                            <a:fontRef idx="minor">
+                              <a:schemeClr val="tx1"/>
+                            </a:fontRef>
+                          </p:style>
+                        </p:cxnSp>
+                      </p:grpSp>
+                      <p:sp>
+                        <p:nvSpPr>
+                          <p:cNvPr id="24" name="TextBox 23"/>
+                          <p:cNvSpPr txBox="1"/>
+                          <p:nvPr/>
+                        </p:nvSpPr>
+                        <p:spPr>
+                          <a:xfrm>
+                            <a:off x="2695762" y="4221282"/>
+                            <a:ext cx="1123951" cy="246221"/>
+                          </a:xfrm>
+                          <a:prstGeom prst="rect">
+                            <a:avLst/>
+                          </a:prstGeom>
+                          <a:noFill/>
+                        </p:spPr>
+                        <p:txBody>
+                          <a:bodyPr wrap="square" rtlCol="0">
+                            <a:spAutoFit/>
+                          </a:bodyPr>
+                          <a:lstStyle/>
+                          <a:p>
+                            <a:pPr algn="ctr"/>
+                            <a:r>
+                              <a:rPr lang="en-US" sz="800" dirty="0" smtClean="0">
+                                <a:latin typeface="Tahoma" panose="020B0604030504040204" pitchFamily="34" charset="0"/>
+                                <a:ea typeface="Tahoma" panose="020B0604030504040204" pitchFamily="34" charset="0"/>
+                                <a:cs typeface="Tahoma" panose="020B0604030504040204" pitchFamily="34" charset="0"/>
+                              </a:rPr>
+                              <a:t>(</a:t>
+                            </a:r>
+                            <a:r>
+                              <a:rPr lang="en-US" sz="800" dirty="0" smtClean="0">
+                                <a:latin typeface="Tahoma" panose="020B0604030504040204" pitchFamily="34" charset="0"/>
+                                <a:ea typeface="Tahoma" panose="020B0604030504040204" pitchFamily="34" charset="0"/>
+                                <a:cs typeface="Tahoma" panose="020B0604030504040204" pitchFamily="34" charset="0"/>
+                              </a:rPr>
+                              <a:t>512</a:t>
+                            </a:r>
+                            <a:r>
+                              <a:rPr lang="en-US" sz="800" dirty="0" smtClean="0">
+                                <a:latin typeface="Tahoma" panose="020B0604030504040204" pitchFamily="34" charset="0"/>
+                                <a:ea typeface="Tahoma" panose="020B0604030504040204" pitchFamily="34" charset="0"/>
+                                <a:cs typeface="Tahoma" panose="020B0604030504040204" pitchFamily="34" charset="0"/>
+                              </a:rPr>
+                              <a:t>, 12, 20)</a:t>
+                            </a:r>
+                            <a:endParaRPr lang="en-US" sz="800" dirty="0">
+                              <a:latin typeface="Tahoma" panose="020B0604030504040204" pitchFamily="34" charset="0"/>
+                              <a:ea typeface="Tahoma" panose="020B0604030504040204" pitchFamily="34" charset="0"/>
+                              <a:cs typeface="Tahoma" panose="020B0604030504040204" pitchFamily="34" charset="0"/>
+                            </a:endParaRPr>
+                          </a:p>
+                        </p:txBody>
+                      </p:sp>
+                      <p:sp>
+                        <p:nvSpPr>
+                          <p:cNvPr id="25" name="TextBox 24"/>
+                          <p:cNvSpPr txBox="1"/>
+                          <p:nvPr/>
+                        </p:nvSpPr>
+                        <p:spPr>
+                          <a:xfrm>
+                            <a:off x="2695762" y="4891644"/>
+                            <a:ext cx="1123951" cy="246221"/>
+                          </a:xfrm>
+                          <a:prstGeom prst="rect">
+                            <a:avLst/>
+                          </a:prstGeom>
+                          <a:noFill/>
+                        </p:spPr>
+                        <p:txBody>
+                          <a:bodyPr wrap="square" rtlCol="0">
+                            <a:spAutoFit/>
+                          </a:bodyPr>
+                          <a:lstStyle/>
+                          <a:p>
+                            <a:pPr algn="ctr"/>
+                            <a:r>
+                              <a:rPr lang="en-US" sz="800" dirty="0">
+                                <a:latin typeface="Tahoma" panose="020B0604030504040204" pitchFamily="34" charset="0"/>
+                                <a:ea typeface="Tahoma" panose="020B0604030504040204" pitchFamily="34" charset="0"/>
+                                <a:cs typeface="Tahoma" panose="020B0604030504040204" pitchFamily="34" charset="0"/>
+                              </a:rPr>
+                              <a:t>(512, 12, 20)</a:t>
+                            </a:r>
+                            <a:endParaRPr lang="en-US" sz="800" dirty="0">
+                              <a:latin typeface="Tahoma" panose="020B0604030504040204" pitchFamily="34" charset="0"/>
+                              <a:ea typeface="Tahoma" panose="020B0604030504040204" pitchFamily="34" charset="0"/>
+                              <a:cs typeface="Tahoma" panose="020B0604030504040204" pitchFamily="34" charset="0"/>
+                            </a:endParaRPr>
+                          </a:p>
+                        </p:txBody>
+                      </p:sp>
+                    </p:grpSp>
+                    <p:grpSp>
+                      <p:nvGrpSpPr>
+                        <p:cNvPr id="15" name="Group 14"/>
+                        <p:cNvGrpSpPr/>
+                        <p:nvPr/>
+                      </p:nvGrpSpPr>
+                      <p:grpSpPr>
+                        <a:xfrm>
+                          <a:off x="7749533" y="4762762"/>
+                          <a:ext cx="1775086" cy="966698"/>
+                          <a:chOff x="1803456" y="3812633"/>
+                          <a:chExt cx="1775086" cy="966698"/>
+                        </a:xfrm>
+                      </p:grpSpPr>
+                      <p:sp>
+                        <p:nvSpPr>
+                          <p:cNvPr id="18" name="Rounded Rectangle 17"/>
+                          <p:cNvSpPr/>
+                          <p:nvPr/>
+                        </p:nvSpPr>
+                        <p:spPr>
+                          <a:xfrm>
+                            <a:off x="1803456" y="3812633"/>
+                            <a:ext cx="1775086" cy="399071"/>
+                          </a:xfrm>
+                          <a:prstGeom prst="roundRect">
+                            <a:avLst/>
+                          </a:prstGeom>
+                          <a:solidFill>
+                            <a:schemeClr val="accent2">
+                              <a:lumMod val="20000"/>
+                              <a:lumOff val="80000"/>
+                            </a:schemeClr>
+                          </a:solidFill>
+                          <a:ln>
+                            <a:solidFill>
+                              <a:schemeClr val="bg1">
+                                <a:lumMod val="75000"/>
+                              </a:schemeClr>
+                            </a:solidFill>
+                          </a:ln>
+                        </p:spPr>
+                        <p:style>
+                          <a:lnRef idx="2">
+                            <a:schemeClr val="accent1">
+                              <a:shade val="50000"/>
+                            </a:schemeClr>
+                          </a:lnRef>
+                          <a:fillRef idx="1">
+                            <a:schemeClr val="accent1"/>
+                          </a:fillRef>
+                          <a:effectRef idx="0">
+                            <a:schemeClr val="accent1"/>
+                          </a:effectRef>
+                          <a:fontRef idx="minor">
+                            <a:schemeClr val="lt1"/>
+                          </a:fontRef>
+                        </p:style>
+                        <p:txBody>
+                          <a:bodyPr rot="0" spcFirstLastPara="0" vertOverflow="overflow" horzOverflow="overflow" vert="horz" wrap="square" lIns="51435" tIns="25718" rIns="51435" bIns="25718" numCol="1" spcCol="0" rtlCol="0" fromWordArt="0" anchor="ctr" anchorCtr="0" forceAA="0" compatLnSpc="1">
+                            <a:prstTxWarp prst="textNoShape">
+                              <a:avLst/>
+                            </a:prstTxWarp>
+                            <a:noAutofit/>
+                          </a:bodyPr>
+                          <a:lstStyle/>
+                          <a:p>
+                            <a:pPr algn="ctr"/>
+                            <a:r>
+                              <a:rPr lang="en-US" sz="800" dirty="0" smtClean="0">
+                                <a:solidFill>
+                                  <a:srgbClr val="0070C0"/>
+                                </a:solidFill>
+                                <a:latin typeface="Tahoma" panose="020B0604030504040204" pitchFamily="34" charset="0"/>
+                                <a:ea typeface="Tahoma" panose="020B0604030504040204" pitchFamily="34" charset="0"/>
+                                <a:cs typeface="Tahoma" panose="020B0604030504040204" pitchFamily="34" charset="0"/>
+                              </a:rPr>
+                              <a:t>Conv2d (512, 3, </a:t>
+                            </a:r>
+                            <a:r>
+                              <a:rPr lang="en-US" sz="800" dirty="0">
+                                <a:solidFill>
+                                  <a:srgbClr val="0070C0"/>
+                                </a:solidFill>
+                                <a:latin typeface="Tahoma" panose="020B0604030504040204" pitchFamily="34" charset="0"/>
+                                <a:ea typeface="Tahoma" panose="020B0604030504040204" pitchFamily="34" charset="0"/>
+                                <a:cs typeface="Tahoma" panose="020B0604030504040204" pitchFamily="34" charset="0"/>
+                              </a:rPr>
+                              <a:t>1</a:t>
+                            </a:r>
+                            <a:r>
+                              <a:rPr lang="en-US" sz="800" dirty="0" smtClean="0">
+                                <a:solidFill>
+                                  <a:srgbClr val="0070C0"/>
+                                </a:solidFill>
+                                <a:latin typeface="Tahoma" panose="020B0604030504040204" pitchFamily="34" charset="0"/>
+                                <a:ea typeface="Tahoma" panose="020B0604030504040204" pitchFamily="34" charset="0"/>
+                                <a:cs typeface="Tahoma" panose="020B0604030504040204" pitchFamily="34" charset="0"/>
+                              </a:rPr>
+                              <a:t>)</a:t>
+                            </a:r>
+                            <a:endParaRPr lang="en-US" sz="800" dirty="0">
+                              <a:solidFill>
+                                <a:srgbClr val="0070C0"/>
+                              </a:solidFill>
+                              <a:latin typeface="Tahoma" panose="020B0604030504040204" pitchFamily="34" charset="0"/>
+                              <a:ea typeface="Tahoma" panose="020B0604030504040204" pitchFamily="34" charset="0"/>
+                              <a:cs typeface="Tahoma" panose="020B0604030504040204" pitchFamily="34" charset="0"/>
+                            </a:endParaRPr>
+                          </a:p>
+                        </p:txBody>
+                      </p:sp>
+                      <p:cxnSp>
+                        <p:nvCxnSpPr>
+                          <p:cNvPr id="21" name="Straight Arrow Connector 20"/>
+                          <p:cNvCxnSpPr>
+                            <a:stCxn id="18" idx="2"/>
+                            <a:endCxn id="39" idx="0"/>
+                          </p:cNvCxnSpPr>
+                          <p:nvPr/>
+                        </p:nvCxnSpPr>
+                        <p:spPr>
+                          <a:xfrm rot="5400000" flipV="1">
+                            <a:off x="2410820" y="4491884"/>
+                            <a:ext cx="567626" cy="7267"/>
+                          </a:xfrm>
+                          <a:prstGeom prst="straightConnector1">
+                            <a:avLst/>
+                          </a:prstGeom>
+                          <a:ln>
+                            <a:solidFill>
+                              <a:schemeClr val="tx1"/>
+                            </a:solidFill>
+                            <a:tailEnd type="triangle"/>
+                          </a:ln>
+                        </p:spPr>
+                        <p:style>
+                          <a:lnRef idx="1">
+                            <a:schemeClr val="accent1"/>
+                          </a:lnRef>
+                          <a:fillRef idx="0">
+                            <a:schemeClr val="accent1"/>
+                          </a:fillRef>
+                          <a:effectRef idx="0">
+                            <a:schemeClr val="accent1"/>
+                          </a:effectRef>
+                          <a:fontRef idx="minor">
+                            <a:schemeClr val="tx1"/>
+                          </a:fontRef>
+                        </p:style>
+                      </p:cxnSp>
+                    </p:grpSp>
+                  </p:grpSp>
+                  <p:sp>
+                    <p:nvSpPr>
+                      <p:cNvPr id="31" name="Rectangle 30"/>
+                      <p:cNvSpPr/>
+                      <p:nvPr/>
+                    </p:nvSpPr>
+                    <p:spPr>
+                      <a:xfrm>
+                        <a:off x="7597246" y="2656338"/>
+                        <a:ext cx="2110866" cy="2658612"/>
+                      </a:xfrm>
+                      <a:prstGeom prst="rect">
+                        <a:avLst/>
+                      </a:prstGeom>
+                      <a:noFill/>
+                      <a:ln w="3175">
+                        <a:solidFill>
+                          <a:schemeClr val="tx1"/>
+                        </a:solidFill>
+                      </a:ln>
+                    </p:spPr>
+                    <p:style>
+                      <a:lnRef idx="2">
+                        <a:schemeClr val="accent1">
+                          <a:shade val="50000"/>
+                        </a:schemeClr>
+                      </a:lnRef>
+                      <a:fillRef idx="1">
+                        <a:schemeClr val="accent1"/>
+                      </a:fillRef>
+                      <a:effectRef idx="0">
+                        <a:schemeClr val="accent1"/>
+                      </a:effectRef>
+                      <a:fontRef idx="minor">
+                        <a:schemeClr val="lt1"/>
+                      </a:fontRef>
+                    </p:style>
+                    <p:txBody>
+                      <a:bodyPr rtlCol="0" anchor="ctr"/>
+                      <a:lstStyle/>
+                      <a:p>
+                        <a:pPr algn="ctr"/>
+                        <a:endParaRPr lang="en-US"/>
+                      </a:p>
+                    </p:txBody>
+                  </p:sp>
+                </p:grpSp>
+              </p:grpSp>
+            </p:grpSp>
+            <p:sp>
+              <p:nvSpPr>
+                <p:cNvPr id="39" name="Rounded Rectangle 38"/>
+                <p:cNvSpPr/>
+                <p:nvPr/>
+              </p:nvSpPr>
+              <p:spPr>
+                <a:xfrm rot="16200000">
+                  <a:off x="7515406" y="1548237"/>
+                  <a:ext cx="1571401" cy="352994"/>
+                </a:xfrm>
+                <a:prstGeom prst="roundRect">
+                  <a:avLst/>
+                </a:prstGeom>
+                <a:solidFill>
+                  <a:schemeClr val="accent6">
+                    <a:lumMod val="20000"/>
+                    <a:lumOff val="80000"/>
+                  </a:schemeClr>
+                </a:solidFill>
+                <a:ln>
+                  <a:solidFill>
+                    <a:schemeClr val="bg1">
+                      <a:lumMod val="75000"/>
+                    </a:schemeClr>
+                  </a:solidFill>
+                </a:ln>
+              </p:spPr>
+              <p:style>
+                <a:lnRef idx="2">
+                  <a:schemeClr val="accent1">
+                    <a:shade val="50000"/>
+                  </a:schemeClr>
+                </a:lnRef>
+                <a:fillRef idx="1">
+                  <a:schemeClr val="accent1"/>
+                </a:fillRef>
+                <a:effectRef idx="0">
+                  <a:schemeClr val="accent1"/>
+                </a:effectRef>
+                <a:fontRef idx="minor">
+                  <a:schemeClr val="lt1"/>
+                </a:fontRef>
+              </p:style>
+              <p:txBody>
+                <a:bodyPr rot="0" spcFirstLastPara="0" vertOverflow="overflow" horzOverflow="overflow" vert="horz" wrap="square" lIns="51435" tIns="25718" rIns="51435" bIns="25718" numCol="1" spcCol="0" rtlCol="0" fromWordArt="0" anchor="ctr" anchorCtr="0" forceAA="0" compatLnSpc="1">
+                  <a:prstTxWarp prst="textNoShape">
+                    <a:avLst/>
+                  </a:prstTxWarp>
+                  <a:noAutofit/>
+                </a:bodyPr>
+                <a:lstStyle/>
+                <a:p>
+                  <a:pPr algn="ctr"/>
+                  <a:r>
+                    <a:rPr lang="en-US" sz="800" dirty="0" smtClean="0">
+                      <a:solidFill>
+                        <a:srgbClr val="0070C0"/>
+                      </a:solidFill>
+                      <a:latin typeface="Tahoma" panose="020B0604030504040204" pitchFamily="34" charset="0"/>
+                      <a:ea typeface="Tahoma" panose="020B0604030504040204" pitchFamily="34" charset="0"/>
+                      <a:cs typeface="Tahoma" panose="020B0604030504040204" pitchFamily="34" charset="0"/>
+                    </a:rPr>
+                    <a:t>Bilinear up sampling</a:t>
+                  </a:r>
+                  <a:endParaRPr lang="en-US" sz="800" dirty="0">
+                    <a:solidFill>
+                      <a:srgbClr val="0070C0"/>
+                    </a:solidFill>
+                    <a:latin typeface="Tahoma" panose="020B0604030504040204" pitchFamily="34" charset="0"/>
+                    <a:ea typeface="Tahoma" panose="020B0604030504040204" pitchFamily="34" charset="0"/>
+                    <a:cs typeface="Tahoma" panose="020B0604030504040204" pitchFamily="34" charset="0"/>
+                  </a:endParaRPr>
+                </a:p>
+              </p:txBody>
+            </p:sp>
+          </p:grpSp>
+          <p:sp>
+            <p:nvSpPr>
+              <p:cNvPr id="42" name="TextBox 41"/>
+              <p:cNvSpPr txBox="1"/>
+              <p:nvPr/>
+            </p:nvSpPr>
+            <p:spPr>
+              <a:xfrm rot="16200000">
+                <a:off x="7422772" y="1130168"/>
+                <a:ext cx="1123951" cy="215444"/>
+              </a:xfrm>
+              <a:prstGeom prst="rect">
+                <a:avLst/>
+              </a:prstGeom>
+              <a:noFill/>
+            </p:spPr>
+            <p:txBody>
+              <a:bodyPr wrap="square" rtlCol="0">
+                <a:spAutoFit/>
+              </a:bodyPr>
+              <a:lstStyle/>
+              <a:p>
+                <a:pPr algn="ctr"/>
+                <a:r>
+                  <a:rPr lang="en-US" sz="800" dirty="0" smtClean="0">
+                    <a:latin typeface="Tahoma" panose="020B0604030504040204" pitchFamily="34" charset="0"/>
+                    <a:ea typeface="Tahoma" panose="020B0604030504040204" pitchFamily="34" charset="0"/>
+                    <a:cs typeface="Tahoma" panose="020B0604030504040204" pitchFamily="34" charset="0"/>
+                  </a:rPr>
+                  <a:t>(3, </a:t>
+                </a:r>
+                <a:r>
+                  <a:rPr lang="en-US" sz="800" dirty="0" smtClean="0">
+                    <a:latin typeface="Tahoma" panose="020B0604030504040204" pitchFamily="34" charset="0"/>
+                    <a:ea typeface="Tahoma" panose="020B0604030504040204" pitchFamily="34" charset="0"/>
+                    <a:cs typeface="Tahoma" panose="020B0604030504040204" pitchFamily="34" charset="0"/>
+                  </a:rPr>
+                  <a:t>12, 20</a:t>
+                </a:r>
+                <a:r>
+                  <a:rPr lang="en-US" sz="800" dirty="0" smtClean="0">
+                    <a:latin typeface="Tahoma" panose="020B0604030504040204" pitchFamily="34" charset="0"/>
+                    <a:ea typeface="Tahoma" panose="020B0604030504040204" pitchFamily="34" charset="0"/>
+                    <a:cs typeface="Tahoma" panose="020B0604030504040204" pitchFamily="34" charset="0"/>
+                  </a:rPr>
+                  <a:t>)</a:t>
+                </a:r>
+                <a:endParaRPr lang="en-US" sz="800" dirty="0">
+                  <a:latin typeface="Tahoma" panose="020B0604030504040204" pitchFamily="34" charset="0"/>
+                  <a:ea typeface="Tahoma" panose="020B0604030504040204" pitchFamily="34" charset="0"/>
+                  <a:cs typeface="Tahoma" panose="020B0604030504040204" pitchFamily="34" charset="0"/>
+                </a:endParaRPr>
+              </a:p>
+            </p:txBody>
+          </p:sp>
+        </p:grpSp>
+      </p:grpSp>
+      <p:cxnSp>
+        <p:nvCxnSpPr>
+          <p:cNvPr id="50" name="Straight Arrow Connector 49"/>
+          <p:cNvCxnSpPr>
+            <a:stCxn id="6" idx="3"/>
+            <a:endCxn id="31" idx="0"/>
+          </p:cNvCxnSpPr>
+          <p:nvPr/>
+        </p:nvCxnSpPr>
+        <p:spPr>
+          <a:xfrm>
+            <a:off x="4894143" y="1722380"/>
+            <a:ext cx="598739" cy="0"/>
+          </a:xfrm>
+          <a:prstGeom prst="straightConnector1">
+            <a:avLst/>
+          </a:prstGeom>
+          <a:ln>
+            <a:solidFill>
+              <a:schemeClr val="tx1"/>
+            </a:solidFill>
+            <a:tailEnd type="triangle"/>
+          </a:ln>
+        </p:spPr>
+        <p:style>
+          <a:lnRef idx="1">
+            <a:schemeClr val="accent1"/>
+          </a:lnRef>
+          <a:fillRef idx="0">
+            <a:schemeClr val="accent1"/>
+          </a:fillRef>
+          <a:effectRef idx="0">
+            <a:schemeClr val="accent1"/>
+          </a:effectRef>
+          <a:fontRef idx="minor">
+            <a:schemeClr val="tx1"/>
+          </a:fontRef>
+        </p:style>
+      </p:cxnSp>
+      <p:cxnSp>
+        <p:nvCxnSpPr>
+          <p:cNvPr id="53" name="Straight Arrow Connector 52"/>
+          <p:cNvCxnSpPr>
+            <a:stCxn id="39" idx="2"/>
+            <a:endCxn id="5" idx="1"/>
+          </p:cNvCxnSpPr>
+          <p:nvPr/>
+        </p:nvCxnSpPr>
+        <p:spPr>
+          <a:xfrm>
+            <a:off x="8564177" y="1729760"/>
+            <a:ext cx="727142" cy="0"/>
+          </a:xfrm>
+          <a:prstGeom prst="straightConnector1">
+            <a:avLst/>
+          </a:prstGeom>
+          <a:ln>
+            <a:solidFill>
+              <a:schemeClr val="tx1"/>
+            </a:solidFill>
+            <a:tailEnd type="triangle"/>
+          </a:ln>
+        </p:spPr>
+        <p:style>
+          <a:lnRef idx="1">
+            <a:schemeClr val="accent1"/>
+          </a:lnRef>
+          <a:fillRef idx="0">
+            <a:schemeClr val="accent1"/>
+          </a:fillRef>
+          <a:effectRef idx="0">
+            <a:schemeClr val="accent1"/>
+          </a:effectRef>
+          <a:fontRef idx="minor">
+            <a:schemeClr val="tx1"/>
+          </a:fontRef>
+        </p:style>
+      </p:cxnSp>
+      <p:cxnSp>
+        <p:nvCxnSpPr>
+          <p:cNvPr id="69" name="Straight Arrow Connector 68"/>
+          <p:cNvCxnSpPr>
+            <a:endCxn id="6" idx="1"/>
+          </p:cNvCxnSpPr>
+          <p:nvPr/>
+        </p:nvCxnSpPr>
+        <p:spPr>
+          <a:xfrm flipV="1">
+            <a:off x="3121105" y="1722380"/>
+            <a:ext cx="558980" cy="2357"/>
+          </a:xfrm>
+          <a:prstGeom prst="straightConnector1">
+            <a:avLst/>
+          </a:prstGeom>
+          <a:ln>
+            <a:solidFill>
+              <a:schemeClr val="tx1"/>
+            </a:solidFill>
+            <a:tailEnd type="triangle"/>
+          </a:ln>
+        </p:spPr>
+        <p:style>
+          <a:lnRef idx="1">
+            <a:schemeClr val="accent1"/>
+          </a:lnRef>
+          <a:fillRef idx="0">
+            <a:schemeClr val="accent1"/>
+          </a:fillRef>
+          <a:effectRef idx="0">
+            <a:schemeClr val="accent1"/>
+          </a:effectRef>
+          <a:fontRef idx="minor">
+            <a:schemeClr val="tx1"/>
+          </a:fontRef>
+        </p:style>
+      </p:cxnSp>
+      <p:sp>
+        <p:nvSpPr>
+          <p:cNvPr id="70" name="TextBox 69"/>
+          <p:cNvSpPr txBox="1"/>
+          <p:nvPr/>
+        </p:nvSpPr>
+        <p:spPr>
+          <a:xfrm>
+            <a:off x="868431" y="470508"/>
+            <a:ext cx="1762148" cy="276999"/>
+          </a:xfrm>
+          <a:prstGeom prst="rect">
+            <a:avLst/>
+          </a:prstGeom>
+          <a:noFill/>
+        </p:spPr>
+        <p:txBody>
+          <a:bodyPr wrap="square" rtlCol="0">
+            <a:spAutoFit/>
+          </a:bodyPr>
+          <a:lstStyle/>
+          <a:p>
+            <a:pPr algn="ctr"/>
+            <a:r>
+              <a:rPr lang="en-US" sz="1200" b="1" dirty="0" smtClean="0">
+                <a:latin typeface="Tahoma" panose="020B0604030504040204" pitchFamily="34" charset="0"/>
+                <a:ea typeface="Tahoma" panose="020B0604030504040204" pitchFamily="34" charset="0"/>
+                <a:cs typeface="Tahoma" panose="020B0604030504040204" pitchFamily="34" charset="0"/>
+              </a:rPr>
+              <a:t>Input Image</a:t>
+            </a:r>
+            <a:endParaRPr lang="en-US" sz="1200" b="1" dirty="0">
+              <a:latin typeface="Tahoma" panose="020B0604030504040204" pitchFamily="34" charset="0"/>
+              <a:ea typeface="Tahoma" panose="020B0604030504040204" pitchFamily="34" charset="0"/>
+              <a:cs typeface="Tahoma" panose="020B0604030504040204" pitchFamily="34" charset="0"/>
+            </a:endParaRPr>
+          </a:p>
+        </p:txBody>
+      </p:sp>
+      <p:sp>
+        <p:nvSpPr>
+          <p:cNvPr id="71" name="TextBox 70"/>
+          <p:cNvSpPr txBox="1"/>
+          <p:nvPr/>
+        </p:nvSpPr>
+        <p:spPr>
+          <a:xfrm>
+            <a:off x="9668196" y="464344"/>
+            <a:ext cx="1989445" cy="276999"/>
+          </a:xfrm>
+          <a:prstGeom prst="rect">
+            <a:avLst/>
+          </a:prstGeom>
+          <a:noFill/>
+        </p:spPr>
+        <p:txBody>
+          <a:bodyPr wrap="square" rtlCol="0">
+            <a:spAutoFit/>
+          </a:bodyPr>
+          <a:lstStyle/>
+          <a:p>
+            <a:pPr algn="ctr"/>
+            <a:r>
+              <a:rPr lang="en-US" sz="1200" b="1" dirty="0" smtClean="0">
+                <a:solidFill>
+                  <a:schemeClr val="accent6"/>
+                </a:solidFill>
+                <a:latin typeface="Tahoma" panose="020B0604030504040204" pitchFamily="34" charset="0"/>
+                <a:ea typeface="Tahoma" panose="020B0604030504040204" pitchFamily="34" charset="0"/>
+                <a:cs typeface="Tahoma" panose="020B0604030504040204" pitchFamily="34" charset="0"/>
+              </a:rPr>
+              <a:t>Segmentation output</a:t>
+            </a:r>
+            <a:endParaRPr lang="en-US" sz="1200" b="1" dirty="0">
+              <a:solidFill>
+                <a:schemeClr val="accent6"/>
+              </a:solidFill>
+              <a:latin typeface="Tahoma" panose="020B0604030504040204" pitchFamily="34" charset="0"/>
+              <a:ea typeface="Tahoma" panose="020B0604030504040204" pitchFamily="34" charset="0"/>
+              <a:cs typeface="Tahoma" panose="020B0604030504040204" pitchFamily="34" charset="0"/>
+            </a:endParaRPr>
+          </a:p>
+        </p:txBody>
+      </p:sp>
+    </p:spTree>
+    <p:extLst>
+      <p:ext uri="{BB962C8B-B14F-4D97-AF65-F5344CB8AC3E}">
+        <p14:creationId xmlns:p14="http://schemas.microsoft.com/office/powerpoint/2010/main" val="1300914027"/>
+      </p:ext>
+    </p:extLst>
+  </p:cSld>
+  <p:clrMapOvr>
+    <a:masterClrMapping/>
+  </p:clrMapOvr>
+</p:sld>
+</file>
+
 <file path=ppt/theme/theme1.xml><?xml version="1.0" encoding="utf-8"?>
 <a:theme xmlns:a="http://schemas.openxmlformats.org/drawingml/2006/main" name="Office Theme">
   <a:themeElements>

</xml_diff>